<commit_message>
Minor fixes in datasheet
</commit_message>
<xml_diff>
--- a/documentation/Phase 2 Datasheet.pptx
+++ b/documentation/Phase 2 Datasheet.pptx
@@ -295,7 +295,7 @@
     </p:spTree>
     <p:extLst>
       <p:ext uri="{BB962C8B-B14F-4D97-AF65-F5344CB8AC3E}">
-        <p14:creationId xmlns:p14="http://schemas.microsoft.com/office/powerpoint/2010/main" xmlns="" val="601205916"/>
+        <p14:creationId xmlns="" xmlns:p14="http://schemas.microsoft.com/office/powerpoint/2010/main" val="601205916"/>
       </p:ext>
     </p:extLst>
   </p:cSld>
@@ -467,7 +467,7 @@
     </p:spTree>
     <p:extLst>
       <p:ext uri="{BB962C8B-B14F-4D97-AF65-F5344CB8AC3E}">
-        <p14:creationId xmlns:p14="http://schemas.microsoft.com/office/powerpoint/2010/main" xmlns="" val="837497645"/>
+        <p14:creationId xmlns="" xmlns:p14="http://schemas.microsoft.com/office/powerpoint/2010/main" val="837497645"/>
       </p:ext>
     </p:extLst>
   </p:cSld>
@@ -649,7 +649,7 @@
     </p:spTree>
     <p:extLst>
       <p:ext uri="{BB962C8B-B14F-4D97-AF65-F5344CB8AC3E}">
-        <p14:creationId xmlns:p14="http://schemas.microsoft.com/office/powerpoint/2010/main" xmlns="" val="417072351"/>
+        <p14:creationId xmlns="" xmlns:p14="http://schemas.microsoft.com/office/powerpoint/2010/main" val="417072351"/>
       </p:ext>
     </p:extLst>
   </p:cSld>
@@ -821,7 +821,7 @@
     </p:spTree>
     <p:extLst>
       <p:ext uri="{BB962C8B-B14F-4D97-AF65-F5344CB8AC3E}">
-        <p14:creationId xmlns:p14="http://schemas.microsoft.com/office/powerpoint/2010/main" xmlns="" val="2474603350"/>
+        <p14:creationId xmlns="" xmlns:p14="http://schemas.microsoft.com/office/powerpoint/2010/main" val="2474603350"/>
       </p:ext>
     </p:extLst>
   </p:cSld>
@@ -1067,7 +1067,7 @@
     </p:spTree>
     <p:extLst>
       <p:ext uri="{BB962C8B-B14F-4D97-AF65-F5344CB8AC3E}">
-        <p14:creationId xmlns:p14="http://schemas.microsoft.com/office/powerpoint/2010/main" xmlns="" val="4046197841"/>
+        <p14:creationId xmlns="" xmlns:p14="http://schemas.microsoft.com/office/powerpoint/2010/main" val="4046197841"/>
       </p:ext>
     </p:extLst>
   </p:cSld>
@@ -1301,7 +1301,7 @@
     </p:spTree>
     <p:extLst>
       <p:ext uri="{BB962C8B-B14F-4D97-AF65-F5344CB8AC3E}">
-        <p14:creationId xmlns:p14="http://schemas.microsoft.com/office/powerpoint/2010/main" xmlns="" val="447416457"/>
+        <p14:creationId xmlns="" xmlns:p14="http://schemas.microsoft.com/office/powerpoint/2010/main" val="447416457"/>
       </p:ext>
     </p:extLst>
   </p:cSld>
@@ -1670,7 +1670,7 @@
     </p:spTree>
     <p:extLst>
       <p:ext uri="{BB962C8B-B14F-4D97-AF65-F5344CB8AC3E}">
-        <p14:creationId xmlns:p14="http://schemas.microsoft.com/office/powerpoint/2010/main" xmlns="" val="98805050"/>
+        <p14:creationId xmlns="" xmlns:p14="http://schemas.microsoft.com/office/powerpoint/2010/main" val="98805050"/>
       </p:ext>
     </p:extLst>
   </p:cSld>
@@ -1790,7 +1790,7 @@
     </p:spTree>
     <p:extLst>
       <p:ext uri="{BB962C8B-B14F-4D97-AF65-F5344CB8AC3E}">
-        <p14:creationId xmlns:p14="http://schemas.microsoft.com/office/powerpoint/2010/main" xmlns="" val="2984433761"/>
+        <p14:creationId xmlns="" xmlns:p14="http://schemas.microsoft.com/office/powerpoint/2010/main" val="2984433761"/>
       </p:ext>
     </p:extLst>
   </p:cSld>
@@ -1887,7 +1887,7 @@
     </p:spTree>
     <p:extLst>
       <p:ext uri="{BB962C8B-B14F-4D97-AF65-F5344CB8AC3E}">
-        <p14:creationId xmlns:p14="http://schemas.microsoft.com/office/powerpoint/2010/main" xmlns="" val="1738998542"/>
+        <p14:creationId xmlns="" xmlns:p14="http://schemas.microsoft.com/office/powerpoint/2010/main" val="1738998542"/>
       </p:ext>
     </p:extLst>
   </p:cSld>
@@ -2166,7 +2166,7 @@
     </p:spTree>
     <p:extLst>
       <p:ext uri="{BB962C8B-B14F-4D97-AF65-F5344CB8AC3E}">
-        <p14:creationId xmlns:p14="http://schemas.microsoft.com/office/powerpoint/2010/main" xmlns="" val="2704217799"/>
+        <p14:creationId xmlns="" xmlns:p14="http://schemas.microsoft.com/office/powerpoint/2010/main" val="2704217799"/>
       </p:ext>
     </p:extLst>
   </p:cSld>
@@ -2425,7 +2425,7 @@
     </p:spTree>
     <p:extLst>
       <p:ext uri="{BB962C8B-B14F-4D97-AF65-F5344CB8AC3E}">
-        <p14:creationId xmlns:p14="http://schemas.microsoft.com/office/powerpoint/2010/main" xmlns="" val="1499776802"/>
+        <p14:creationId xmlns="" xmlns:p14="http://schemas.microsoft.com/office/powerpoint/2010/main" val="1499776802"/>
       </p:ext>
     </p:extLst>
   </p:cSld>
@@ -2676,7 +2676,7 @@
     </p:spTree>
     <p:extLst>
       <p:ext uri="{BB962C8B-B14F-4D97-AF65-F5344CB8AC3E}">
-        <p14:creationId xmlns:p14="http://schemas.microsoft.com/office/powerpoint/2010/main" xmlns="" val="2967994719"/>
+        <p14:creationId xmlns="" xmlns:p14="http://schemas.microsoft.com/office/powerpoint/2010/main" val="2967994719"/>
       </p:ext>
     </p:extLst>
   </p:cSld>
@@ -2999,7 +2999,7 @@
           <p:cNvPr id="4" name="Rectangle 3">
             <a:extLst>
               <a:ext uri="{FF2B5EF4-FFF2-40B4-BE49-F238E27FC236}">
-                <a16:creationId xmlns:a16="http://schemas.microsoft.com/office/drawing/2014/main" xmlns="" id="{4E39E7DC-8BF7-4505-8099-D2834EB0D78C}"/>
+                <a16:creationId xmlns="" xmlns:a16="http://schemas.microsoft.com/office/drawing/2014/main" id="{4E39E7DC-8BF7-4505-8099-D2834EB0D78C}"/>
               </a:ext>
             </a:extLst>
           </p:cNvPr>
@@ -3051,7 +3051,7 @@
           <p:cNvPr id="28" name="Rectangle 27">
             <a:extLst>
               <a:ext uri="{FF2B5EF4-FFF2-40B4-BE49-F238E27FC236}">
-                <a16:creationId xmlns:a16="http://schemas.microsoft.com/office/drawing/2014/main" xmlns="" id="{B4099C7B-AE0B-425C-8A7A-ACAADEF7A878}"/>
+                <a16:creationId xmlns="" xmlns:a16="http://schemas.microsoft.com/office/drawing/2014/main" id="{B4099C7B-AE0B-425C-8A7A-ACAADEF7A878}"/>
               </a:ext>
             </a:extLst>
           </p:cNvPr>
@@ -3098,15 +3098,649 @@
           </a:p>
         </p:txBody>
       </p:sp>
-      <p:grpSp>
-        <p:nvGrpSpPr>
-          <p:cNvPr id="5" name="Group 4">
+      <p:sp>
+        <p:nvSpPr>
+          <p:cNvPr id="29" name="TextBox 28">
             <a:extLst>
               <a:ext uri="{FF2B5EF4-FFF2-40B4-BE49-F238E27FC236}">
-                <a16:creationId xmlns:a16="http://schemas.microsoft.com/office/drawing/2014/main" xmlns="" id="{DD0FDBC8-EE9D-4433-8D83-4A24E88F9CE2}"/>
+                <a16:creationId xmlns="" xmlns:a16="http://schemas.microsoft.com/office/drawing/2014/main" id="{EDA5309A-C74D-495F-A990-B14AFA67575F}"/>
               </a:ext>
             </a:extLst>
           </p:cNvPr>
+          <p:cNvSpPr txBox="1"/>
+          <p:nvPr/>
+        </p:nvSpPr>
+        <p:spPr>
+          <a:xfrm>
+            <a:off x="442913" y="6599092"/>
+            <a:ext cx="2415020" cy="369332"/>
+          </a:xfrm>
+          <a:prstGeom prst="rect">
+            <a:avLst/>
+          </a:prstGeom>
+          <a:noFill/>
+        </p:spPr>
+        <p:txBody>
+          <a:bodyPr wrap="none" rtlCol="0">
+            <a:spAutoFit/>
+          </a:bodyPr>
+          <a:lstStyle/>
+          <a:p>
+            <a:r>
+              <a:rPr lang="en-NZ" u="sng" dirty="0"/>
+              <a:t>Interface Block Diagram</a:t>
+            </a:r>
+          </a:p>
+        </p:txBody>
+      </p:sp>
+      <p:sp>
+        <p:nvSpPr>
+          <p:cNvPr id="30" name="TextBox 29">
+            <a:extLst>
+              <a:ext uri="{FF2B5EF4-FFF2-40B4-BE49-F238E27FC236}">
+                <a16:creationId xmlns="" xmlns:a16="http://schemas.microsoft.com/office/drawing/2014/main" id="{D117A3BF-C002-42A4-97A4-FA42EAD1B659}"/>
+              </a:ext>
+            </a:extLst>
+          </p:cNvPr>
+          <p:cNvSpPr txBox="1"/>
+          <p:nvPr/>
+        </p:nvSpPr>
+        <p:spPr>
+          <a:xfrm>
+            <a:off x="253435" y="289878"/>
+            <a:ext cx="3325077" cy="461665"/>
+          </a:xfrm>
+          <a:prstGeom prst="rect">
+            <a:avLst/>
+          </a:prstGeom>
+          <a:noFill/>
+        </p:spPr>
+        <p:txBody>
+          <a:bodyPr wrap="none" rtlCol="0">
+            <a:spAutoFit/>
+          </a:bodyPr>
+          <a:lstStyle/>
+          <a:p>
+            <a:r>
+              <a:rPr lang="en-NZ" sz="2400" b="1" dirty="0"/>
+              <a:t>Hardware Filtering Stage</a:t>
+            </a:r>
+          </a:p>
+        </p:txBody>
+      </p:sp>
+      <p:sp>
+        <p:nvSpPr>
+          <p:cNvPr id="31" name="Rectangle 30">
+            <a:extLst>
+              <a:ext uri="{FF2B5EF4-FFF2-40B4-BE49-F238E27FC236}">
+                <a16:creationId xmlns="" xmlns:a16="http://schemas.microsoft.com/office/drawing/2014/main" id="{68B3D08F-9401-492D-8F29-7BD55A79E587}"/>
+              </a:ext>
+            </a:extLst>
+          </p:cNvPr>
+          <p:cNvSpPr/>
+          <p:nvPr/>
+        </p:nvSpPr>
+        <p:spPr>
+          <a:xfrm>
+            <a:off x="442912" y="935973"/>
+            <a:ext cx="3002723" cy="5349486"/>
+          </a:xfrm>
+          <a:prstGeom prst="rect">
+            <a:avLst/>
+          </a:prstGeom>
+          <a:noFill/>
+          <a:ln w="19050">
+            <a:solidFill>
+              <a:schemeClr val="tx1"/>
+            </a:solidFill>
+          </a:ln>
+        </p:spPr>
+        <p:style>
+          <a:lnRef idx="2">
+            <a:schemeClr val="accent1">
+              <a:shade val="50000"/>
+            </a:schemeClr>
+          </a:lnRef>
+          <a:fillRef idx="1">
+            <a:schemeClr val="accent1"/>
+          </a:fillRef>
+          <a:effectRef idx="0">
+            <a:schemeClr val="accent1"/>
+          </a:effectRef>
+          <a:fontRef idx="minor">
+            <a:schemeClr val="lt1"/>
+          </a:fontRef>
+        </p:style>
+        <p:txBody>
+          <a:bodyPr rtlCol="0" anchor="ctr"/>
+          <a:lstStyle/>
+          <a:p>
+            <a:pPr algn="ctr"/>
+            <a:endParaRPr lang="en-NZ" dirty="0"/>
+          </a:p>
+        </p:txBody>
+      </p:sp>
+      <p:sp>
+        <p:nvSpPr>
+          <p:cNvPr id="32" name="TextBox 31">
+            <a:extLst>
+              <a:ext uri="{FF2B5EF4-FFF2-40B4-BE49-F238E27FC236}">
+                <a16:creationId xmlns="" xmlns:a16="http://schemas.microsoft.com/office/drawing/2014/main" id="{B4A0254B-0478-4380-BBD6-E6C8D983A15F}"/>
+              </a:ext>
+            </a:extLst>
+          </p:cNvPr>
+          <p:cNvSpPr txBox="1"/>
+          <p:nvPr/>
+        </p:nvSpPr>
+        <p:spPr>
+          <a:xfrm>
+            <a:off x="436181" y="943982"/>
+            <a:ext cx="3023776" cy="5278368"/>
+          </a:xfrm>
+          <a:prstGeom prst="rect">
+            <a:avLst/>
+          </a:prstGeom>
+          <a:noFill/>
+        </p:spPr>
+        <p:txBody>
+          <a:bodyPr wrap="none" rtlCol="0">
+            <a:spAutoFit/>
+          </a:bodyPr>
+          <a:lstStyle/>
+          <a:p>
+            <a:r>
+              <a:rPr lang="en-NZ" u="sng" dirty="0"/>
+              <a:t>Memory Mapped Registers</a:t>
+            </a:r>
+          </a:p>
+          <a:p>
+            <a:endParaRPr lang="en-NZ" dirty="0"/>
+          </a:p>
+          <a:p>
+            <a:r>
+              <a:rPr lang="en-NZ" sz="1500" dirty="0" smtClean="0"/>
+              <a:t>PIO_0 </a:t>
+            </a:r>
+            <a:r>
+              <a:rPr lang="en-NZ" sz="1500" i="1" dirty="0"/>
+              <a:t>(24 bits)</a:t>
+            </a:r>
+          </a:p>
+          <a:p>
+            <a:pPr marL="285750" indent="-285750">
+              <a:buFont typeface="Arial" panose="020B0604020202020204" pitchFamily="34" charset="0"/>
+              <a:buChar char="•"/>
+            </a:pPr>
+            <a:r>
+              <a:rPr lang="en-NZ" sz="1500" dirty="0"/>
+              <a:t>24-bit data vector</a:t>
+            </a:r>
+          </a:p>
+          <a:p>
+            <a:pPr marL="285750" indent="-285750">
+              <a:buFont typeface="Arial" panose="020B0604020202020204" pitchFamily="34" charset="0"/>
+              <a:buChar char="•"/>
+            </a:pPr>
+            <a:r>
+              <a:rPr lang="en-NZ" sz="1500" dirty="0" smtClean="0"/>
+              <a:t>Top 3 </a:t>
+            </a:r>
+            <a:r>
+              <a:rPr lang="en-NZ" sz="1500" dirty="0"/>
+              <a:t>pixels in 3x3 window</a:t>
+            </a:r>
+          </a:p>
+          <a:p>
+            <a:endParaRPr lang="en-NZ" sz="1500" dirty="0"/>
+          </a:p>
+          <a:p>
+            <a:r>
+              <a:rPr lang="en-NZ" sz="1500" dirty="0" smtClean="0"/>
+              <a:t>PIO_1 </a:t>
+            </a:r>
+            <a:r>
+              <a:rPr lang="en-NZ" sz="1500" i="1" dirty="0"/>
+              <a:t>(24 bits)</a:t>
+            </a:r>
+          </a:p>
+          <a:p>
+            <a:pPr marL="285750" indent="-285750">
+              <a:buFont typeface="Arial" panose="020B0604020202020204" pitchFamily="34" charset="0"/>
+              <a:buChar char="•"/>
+            </a:pPr>
+            <a:r>
+              <a:rPr lang="en-NZ" sz="1500" dirty="0"/>
+              <a:t>24-bit data vector</a:t>
+            </a:r>
+          </a:p>
+          <a:p>
+            <a:pPr marL="285750" indent="-285750">
+              <a:buFont typeface="Arial" panose="020B0604020202020204" pitchFamily="34" charset="0"/>
+              <a:buChar char="•"/>
+            </a:pPr>
+            <a:r>
+              <a:rPr lang="en-NZ" sz="1500" dirty="0" smtClean="0"/>
+              <a:t>Middle 3 </a:t>
+            </a:r>
+            <a:r>
+              <a:rPr lang="en-NZ" sz="1500" dirty="0"/>
+              <a:t>pixels in 3x3 window</a:t>
+            </a:r>
+          </a:p>
+          <a:p>
+            <a:pPr marL="285750" indent="-285750">
+              <a:buFont typeface="Arial" panose="020B0604020202020204" pitchFamily="34" charset="0"/>
+              <a:buChar char="•"/>
+            </a:pPr>
+            <a:endParaRPr lang="en-NZ" sz="1500" dirty="0"/>
+          </a:p>
+          <a:p>
+            <a:r>
+              <a:rPr lang="en-NZ" sz="1500" dirty="0" smtClean="0"/>
+              <a:t>PIO_2 </a:t>
+            </a:r>
+            <a:r>
+              <a:rPr lang="en-NZ" sz="1500" i="1" dirty="0"/>
+              <a:t>(24 bits)</a:t>
+            </a:r>
+          </a:p>
+          <a:p>
+            <a:pPr marL="285750" indent="-285750">
+              <a:buFont typeface="Arial" panose="020B0604020202020204" pitchFamily="34" charset="0"/>
+              <a:buChar char="•"/>
+            </a:pPr>
+            <a:r>
+              <a:rPr lang="en-NZ" sz="1500" dirty="0"/>
+              <a:t>24-bit data vector</a:t>
+            </a:r>
+          </a:p>
+          <a:p>
+            <a:pPr marL="285750" indent="-285750">
+              <a:buFont typeface="Arial" panose="020B0604020202020204" pitchFamily="34" charset="0"/>
+              <a:buChar char="•"/>
+            </a:pPr>
+            <a:r>
+              <a:rPr lang="en-NZ" sz="1500" dirty="0" smtClean="0"/>
+              <a:t>Bottom 3 </a:t>
+            </a:r>
+            <a:r>
+              <a:rPr lang="en-NZ" sz="1500" dirty="0"/>
+              <a:t>pixels in 3x3 window</a:t>
+            </a:r>
+          </a:p>
+          <a:p>
+            <a:endParaRPr lang="en-NZ" sz="1500" dirty="0"/>
+          </a:p>
+          <a:p>
+            <a:r>
+              <a:rPr lang="en-NZ" sz="1500" dirty="0" smtClean="0"/>
+              <a:t>PIO_3 </a:t>
+            </a:r>
+            <a:r>
+              <a:rPr lang="en-NZ" sz="1500" i="1" dirty="0"/>
+              <a:t>(16 bits)</a:t>
+            </a:r>
+          </a:p>
+          <a:p>
+            <a:pPr marL="285750" indent="-285750">
+              <a:buFont typeface="Arial" panose="020B0604020202020204" pitchFamily="34" charset="0"/>
+              <a:buChar char="•"/>
+            </a:pPr>
+            <a:r>
+              <a:rPr lang="en-NZ" sz="1500" dirty="0"/>
+              <a:t>16-bit ID vector</a:t>
+            </a:r>
+          </a:p>
+          <a:p>
+            <a:pPr marL="285750" indent="-285750">
+              <a:buFont typeface="Arial" panose="020B0604020202020204" pitchFamily="34" charset="0"/>
+              <a:buChar char="•"/>
+            </a:pPr>
+            <a:r>
+              <a:rPr lang="en-NZ" sz="1500" dirty="0"/>
+              <a:t>Identifies 3x3 window</a:t>
+            </a:r>
+          </a:p>
+          <a:p>
+            <a:pPr marL="285750" indent="-285750">
+              <a:buFont typeface="Arial" panose="020B0604020202020204" pitchFamily="34" charset="0"/>
+              <a:buChar char="•"/>
+            </a:pPr>
+            <a:endParaRPr lang="en-NZ" sz="1500" dirty="0"/>
+          </a:p>
+          <a:p>
+            <a:r>
+              <a:rPr lang="en-NZ" sz="1500" dirty="0" smtClean="0"/>
+              <a:t>PIO_4 </a:t>
+            </a:r>
+            <a:r>
+              <a:rPr lang="en-NZ" sz="1500" i="1" dirty="0"/>
+              <a:t>(24 bits)</a:t>
+            </a:r>
+          </a:p>
+          <a:p>
+            <a:pPr marL="285750" indent="-285750">
+              <a:buFont typeface="Arial" panose="020B0604020202020204" pitchFamily="34" charset="0"/>
+              <a:buChar char="•"/>
+            </a:pPr>
+            <a:r>
+              <a:rPr lang="en-NZ" sz="1500" dirty="0"/>
+              <a:t>First 16 bits is the ID vector</a:t>
+            </a:r>
+          </a:p>
+          <a:p>
+            <a:pPr marL="285750" indent="-285750">
+              <a:buFont typeface="Arial" panose="020B0604020202020204" pitchFamily="34" charset="0"/>
+              <a:buChar char="•"/>
+            </a:pPr>
+            <a:r>
+              <a:rPr lang="en-NZ" sz="1500" dirty="0"/>
+              <a:t>Next 8 bits is the computed pixel</a:t>
+            </a:r>
+          </a:p>
+          <a:p>
+            <a:endParaRPr lang="en-NZ" sz="1600" dirty="0"/>
+          </a:p>
+        </p:txBody>
+      </p:sp>
+      <p:sp>
+        <p:nvSpPr>
+          <p:cNvPr id="33" name="Rectangle 32">
+            <a:extLst>
+              <a:ext uri="{FF2B5EF4-FFF2-40B4-BE49-F238E27FC236}">
+                <a16:creationId xmlns="" xmlns:a16="http://schemas.microsoft.com/office/drawing/2014/main" id="{4D6DCE2E-A46F-4736-9759-13EEBFC1B1C9}"/>
+              </a:ext>
+            </a:extLst>
+          </p:cNvPr>
+          <p:cNvSpPr/>
+          <p:nvPr/>
+        </p:nvSpPr>
+        <p:spPr>
+          <a:xfrm>
+            <a:off x="3794580" y="462123"/>
+            <a:ext cx="2612775" cy="1333050"/>
+          </a:xfrm>
+          <a:prstGeom prst="rect">
+            <a:avLst/>
+          </a:prstGeom>
+          <a:noFill/>
+          <a:ln w="19050">
+            <a:solidFill>
+              <a:schemeClr val="tx1"/>
+            </a:solidFill>
+          </a:ln>
+        </p:spPr>
+        <p:style>
+          <a:lnRef idx="2">
+            <a:schemeClr val="accent1">
+              <a:shade val="50000"/>
+            </a:schemeClr>
+          </a:lnRef>
+          <a:fillRef idx="1">
+            <a:schemeClr val="accent1"/>
+          </a:fillRef>
+          <a:effectRef idx="0">
+            <a:schemeClr val="accent1"/>
+          </a:effectRef>
+          <a:fontRef idx="minor">
+            <a:schemeClr val="lt1"/>
+          </a:fontRef>
+        </p:style>
+        <p:txBody>
+          <a:bodyPr rtlCol="0" anchor="ctr"/>
+          <a:lstStyle/>
+          <a:p>
+            <a:pPr algn="ctr"/>
+            <a:endParaRPr lang="en-NZ" dirty="0"/>
+          </a:p>
+        </p:txBody>
+      </p:sp>
+      <p:sp>
+        <p:nvSpPr>
+          <p:cNvPr id="34" name="TextBox 33">
+            <a:extLst>
+              <a:ext uri="{FF2B5EF4-FFF2-40B4-BE49-F238E27FC236}">
+                <a16:creationId xmlns="" xmlns:a16="http://schemas.microsoft.com/office/drawing/2014/main" id="{830F5BF7-003D-4AC8-B7A7-8C6B17DEBFD6}"/>
+              </a:ext>
+            </a:extLst>
+          </p:cNvPr>
+          <p:cNvSpPr txBox="1"/>
+          <p:nvPr/>
+        </p:nvSpPr>
+        <p:spPr>
+          <a:xfrm>
+            <a:off x="3853013" y="548353"/>
+            <a:ext cx="1895584" cy="1200329"/>
+          </a:xfrm>
+          <a:prstGeom prst="rect">
+            <a:avLst/>
+          </a:prstGeom>
+          <a:noFill/>
+        </p:spPr>
+        <p:txBody>
+          <a:bodyPr wrap="none" rtlCol="0">
+            <a:spAutoFit/>
+          </a:bodyPr>
+          <a:lstStyle/>
+          <a:p>
+            <a:r>
+              <a:rPr lang="en-NZ" b="1" dirty="0"/>
+              <a:t>COMPSYS 701</a:t>
+            </a:r>
+          </a:p>
+          <a:p>
+            <a:r>
+              <a:rPr lang="en-NZ" dirty="0"/>
+              <a:t>Project Phase Two</a:t>
+            </a:r>
+          </a:p>
+          <a:p>
+            <a:endParaRPr lang="en-NZ" dirty="0"/>
+          </a:p>
+          <a:p>
+            <a:r>
+              <a:rPr lang="en-NZ" dirty="0"/>
+              <a:t>Group 4</a:t>
+            </a:r>
+          </a:p>
+        </p:txBody>
+      </p:sp>
+      <p:sp>
+        <p:nvSpPr>
+          <p:cNvPr id="35" name="Rectangle 34">
+            <a:extLst>
+              <a:ext uri="{FF2B5EF4-FFF2-40B4-BE49-F238E27FC236}">
+                <a16:creationId xmlns="" xmlns:a16="http://schemas.microsoft.com/office/drawing/2014/main" id="{2597C520-F46C-4907-AC9E-F2A95D0CE791}"/>
+              </a:ext>
+            </a:extLst>
+          </p:cNvPr>
+          <p:cNvSpPr/>
+          <p:nvPr/>
+        </p:nvSpPr>
+        <p:spPr>
+          <a:xfrm>
+            <a:off x="3794580" y="2078277"/>
+            <a:ext cx="2612775" cy="4207182"/>
+          </a:xfrm>
+          <a:prstGeom prst="rect">
+            <a:avLst/>
+          </a:prstGeom>
+          <a:noFill/>
+          <a:ln w="19050">
+            <a:solidFill>
+              <a:schemeClr val="tx1"/>
+            </a:solidFill>
+          </a:ln>
+        </p:spPr>
+        <p:style>
+          <a:lnRef idx="2">
+            <a:schemeClr val="accent1">
+              <a:shade val="50000"/>
+            </a:schemeClr>
+          </a:lnRef>
+          <a:fillRef idx="1">
+            <a:schemeClr val="accent1"/>
+          </a:fillRef>
+          <a:effectRef idx="0">
+            <a:schemeClr val="accent1"/>
+          </a:effectRef>
+          <a:fontRef idx="minor">
+            <a:schemeClr val="lt1"/>
+          </a:fontRef>
+        </p:style>
+        <p:txBody>
+          <a:bodyPr rtlCol="0" anchor="ctr"/>
+          <a:lstStyle/>
+          <a:p>
+            <a:pPr algn="ctr"/>
+            <a:endParaRPr lang="en-NZ" dirty="0"/>
+          </a:p>
+        </p:txBody>
+      </p:sp>
+      <p:sp>
+        <p:nvSpPr>
+          <p:cNvPr id="36" name="TextBox 35">
+            <a:extLst>
+              <a:ext uri="{FF2B5EF4-FFF2-40B4-BE49-F238E27FC236}">
+                <a16:creationId xmlns="" xmlns:a16="http://schemas.microsoft.com/office/drawing/2014/main" id="{8C453154-660E-418B-904C-5F7E234EA62B}"/>
+              </a:ext>
+            </a:extLst>
+          </p:cNvPr>
+          <p:cNvSpPr txBox="1"/>
+          <p:nvPr/>
+        </p:nvSpPr>
+        <p:spPr>
+          <a:xfrm>
+            <a:off x="3809107" y="2108107"/>
+            <a:ext cx="2598248" cy="4847481"/>
+          </a:xfrm>
+          <a:prstGeom prst="rect">
+            <a:avLst/>
+          </a:prstGeom>
+          <a:noFill/>
+        </p:spPr>
+        <p:txBody>
+          <a:bodyPr wrap="square" rtlCol="0">
+            <a:spAutoFit/>
+          </a:bodyPr>
+          <a:lstStyle/>
+          <a:p>
+            <a:r>
+              <a:rPr lang="en-NZ" u="sng" dirty="0"/>
+              <a:t>Operation</a:t>
+            </a:r>
+          </a:p>
+          <a:p>
+            <a:endParaRPr lang="en-NZ" u="sng" dirty="0"/>
+          </a:p>
+          <a:p>
+            <a:pPr marL="285750" indent="-285750">
+              <a:buFont typeface="Arial" panose="020B0604020202020204" pitchFamily="34" charset="0"/>
+              <a:buChar char="•"/>
+            </a:pPr>
+            <a:r>
+              <a:rPr lang="en-NZ" sz="1500" dirty="0"/>
+              <a:t>Convert 3x3 window into three 24-bit binary numbers, each composed of three 8-bit chars concatenated together</a:t>
+            </a:r>
+          </a:p>
+          <a:p>
+            <a:pPr marL="285750" indent="-285750">
+              <a:buFont typeface="Arial" panose="020B0604020202020204" pitchFamily="34" charset="0"/>
+              <a:buChar char="•"/>
+            </a:pPr>
+            <a:endParaRPr lang="en-NZ" sz="1500" dirty="0"/>
+          </a:p>
+          <a:p>
+            <a:pPr marL="285750" indent="-285750">
+              <a:buFont typeface="Arial" panose="020B0604020202020204" pitchFamily="34" charset="0"/>
+              <a:buChar char="•"/>
+            </a:pPr>
+            <a:r>
+              <a:rPr lang="en-NZ" sz="1500" dirty="0"/>
+              <a:t>Write binary numbers </a:t>
+            </a:r>
+            <a:r>
+              <a:rPr lang="en-NZ" sz="1500" dirty="0" smtClean="0"/>
+              <a:t>to the </a:t>
+            </a:r>
+            <a:r>
+              <a:rPr lang="en-NZ" sz="1500" dirty="0"/>
+              <a:t>data registers and a unique ID </a:t>
+            </a:r>
+            <a:r>
+              <a:rPr lang="en-NZ" sz="1500" dirty="0" smtClean="0"/>
+              <a:t>to the ID register</a:t>
+            </a:r>
+            <a:endParaRPr lang="en-NZ" sz="1500" dirty="0"/>
+          </a:p>
+          <a:p>
+            <a:endParaRPr lang="en-NZ" sz="1500" dirty="0"/>
+          </a:p>
+          <a:p>
+            <a:pPr marL="285750" indent="-285750">
+              <a:buFont typeface="Arial" panose="020B0604020202020204" pitchFamily="34" charset="0"/>
+              <a:buChar char="•"/>
+            </a:pPr>
+            <a:r>
+              <a:rPr lang="en-NZ" sz="1500" dirty="0"/>
+              <a:t>Wait for FPGA to write </a:t>
+            </a:r>
+            <a:r>
+              <a:rPr lang="en-NZ" sz="1500" dirty="0" smtClean="0"/>
+              <a:t>to the </a:t>
+            </a:r>
+            <a:r>
+              <a:rPr lang="en-NZ" sz="1500" dirty="0"/>
+              <a:t>receive register</a:t>
+            </a:r>
+          </a:p>
+          <a:p>
+            <a:pPr marL="285750" indent="-285750">
+              <a:buFont typeface="Arial" panose="020B0604020202020204" pitchFamily="34" charset="0"/>
+              <a:buChar char="•"/>
+            </a:pPr>
+            <a:endParaRPr lang="en-NZ" sz="1500" dirty="0"/>
+          </a:p>
+          <a:p>
+            <a:pPr marL="285750" indent="-285750">
+              <a:buFont typeface="Arial" panose="020B0604020202020204" pitchFamily="34" charset="0"/>
+              <a:buChar char="•"/>
+            </a:pPr>
+            <a:r>
+              <a:rPr lang="en-NZ" sz="1500" dirty="0"/>
+              <a:t>Use ID to </a:t>
+            </a:r>
+            <a:r>
+              <a:rPr lang="en-NZ" sz="1500" dirty="0" smtClean="0"/>
+              <a:t>place the receive </a:t>
+            </a:r>
+            <a:r>
+              <a:rPr lang="en-NZ" sz="1500" dirty="0"/>
+              <a:t>char in the correct position</a:t>
+            </a:r>
+          </a:p>
+          <a:p>
+            <a:pPr marL="285750" indent="-285750">
+              <a:buFont typeface="Arial" panose="020B0604020202020204" pitchFamily="34" charset="0"/>
+              <a:buChar char="•"/>
+            </a:pPr>
+            <a:endParaRPr lang="en-NZ" sz="1500" dirty="0"/>
+          </a:p>
+          <a:p>
+            <a:pPr marL="285750" indent="-285750">
+              <a:buFont typeface="Arial" panose="020B0604020202020204" pitchFamily="34" charset="0"/>
+              <a:buChar char="•"/>
+            </a:pPr>
+            <a:endParaRPr lang="en-NZ" sz="1500" dirty="0"/>
+          </a:p>
+          <a:p>
+            <a:endParaRPr lang="en-NZ" dirty="0"/>
+          </a:p>
+        </p:txBody>
+      </p:sp>
+      <p:grpSp>
+        <p:nvGrpSpPr>
+          <p:cNvPr id="38" name="Group 37"/>
           <p:cNvGrpSpPr/>
           <p:nvPr/>
         </p:nvGrpSpPr>
@@ -3114,8 +3748,8 @@
           <a:xfrm>
             <a:off x="901890" y="6972300"/>
             <a:ext cx="5054220" cy="2326762"/>
-            <a:chOff x="683568" y="1448800"/>
-            <a:chExt cx="7272808" cy="3348112"/>
+            <a:chOff x="901890" y="6972300"/>
+            <a:chExt cx="5054220" cy="2326762"/>
           </a:xfrm>
         </p:grpSpPr>
         <p:sp>
@@ -3123,7 +3757,7 @@
             <p:cNvPr id="6" name="Rectangle 5">
               <a:extLst>
                 <a:ext uri="{FF2B5EF4-FFF2-40B4-BE49-F238E27FC236}">
-                  <a16:creationId xmlns:a16="http://schemas.microsoft.com/office/drawing/2014/main" xmlns="" id="{58B46799-3000-486C-8E2C-02A0C5DDD0DF}"/>
+                  <a16:creationId xmlns="" xmlns:a16="http://schemas.microsoft.com/office/drawing/2014/main" id="{58B46799-3000-486C-8E2C-02A0C5DDD0DF}"/>
                 </a:ext>
               </a:extLst>
             </p:cNvPr>
@@ -3132,8 +3766,8 @@
           </p:nvSpPr>
           <p:spPr>
             <a:xfrm>
-              <a:off x="683568" y="1448800"/>
-              <a:ext cx="720000" cy="720000"/>
+              <a:off x="901890" y="6972300"/>
+              <a:ext cx="500362" cy="500362"/>
             </a:xfrm>
             <a:prstGeom prst="rect">
               <a:avLst/>
@@ -3175,7 +3809,7 @@
             <p:cNvPr id="7" name="Rectangle 6">
               <a:extLst>
                 <a:ext uri="{FF2B5EF4-FFF2-40B4-BE49-F238E27FC236}">
-                  <a16:creationId xmlns:a16="http://schemas.microsoft.com/office/drawing/2014/main" xmlns="" id="{A96A564B-8E83-4A74-9A81-5CC9913C654D}"/>
+                  <a16:creationId xmlns="" xmlns:a16="http://schemas.microsoft.com/office/drawing/2014/main" id="{A96A564B-8E83-4A74-9A81-5CC9913C654D}"/>
                 </a:ext>
               </a:extLst>
             </p:cNvPr>
@@ -3184,8 +3818,8 @@
           </p:nvSpPr>
           <p:spPr>
             <a:xfrm>
-              <a:off x="1403648" y="1628800"/>
-              <a:ext cx="6552728" cy="360000"/>
+              <a:off x="1402308" y="7097391"/>
+              <a:ext cx="4553802" cy="250181"/>
             </a:xfrm>
             <a:prstGeom prst="rect">
               <a:avLst/>
@@ -3227,7 +3861,7 @@
             <p:cNvPr id="8" name="Rectangle 7">
               <a:extLst>
                 <a:ext uri="{FF2B5EF4-FFF2-40B4-BE49-F238E27FC236}">
-                  <a16:creationId xmlns:a16="http://schemas.microsoft.com/office/drawing/2014/main" xmlns="" id="{61D1C511-A292-470C-98CB-D582D963D8C8}"/>
+                  <a16:creationId xmlns="" xmlns:a16="http://schemas.microsoft.com/office/drawing/2014/main" id="{61D1C511-A292-470C-98CB-D582D963D8C8}"/>
                 </a:ext>
               </a:extLst>
             </p:cNvPr>
@@ -3236,8 +3870,8 @@
           </p:nvSpPr>
           <p:spPr>
             <a:xfrm>
-              <a:off x="3600352" y="2636912"/>
-              <a:ext cx="2160000" cy="2160000"/>
+              <a:off x="2928902" y="7797975"/>
+              <a:ext cx="1501087" cy="1501087"/>
             </a:xfrm>
             <a:prstGeom prst="rect">
               <a:avLst/>
@@ -3279,7 +3913,7 @@
             <p:cNvPr id="9" name="Rectangle 8">
               <a:extLst>
                 <a:ext uri="{FF2B5EF4-FFF2-40B4-BE49-F238E27FC236}">
-                  <a16:creationId xmlns:a16="http://schemas.microsoft.com/office/drawing/2014/main" xmlns="" id="{970A6B7A-289B-465B-A64B-6EE6CD46743A}"/>
+                  <a16:creationId xmlns="" xmlns:a16="http://schemas.microsoft.com/office/drawing/2014/main" id="{970A6B7A-289B-465B-A64B-6EE6CD46743A}"/>
                 </a:ext>
               </a:extLst>
             </p:cNvPr>
@@ -3288,8 +3922,8 @@
           </p:nvSpPr>
           <p:spPr>
             <a:xfrm>
-              <a:off x="4140352" y="3176912"/>
-              <a:ext cx="1080000" cy="1080000"/>
+              <a:off x="3304174" y="8173247"/>
+              <a:ext cx="750543" cy="750543"/>
             </a:xfrm>
             <a:prstGeom prst="rect">
               <a:avLst/>
@@ -3331,7 +3965,7 @@
             <p:cNvPr id="10" name="Straight Arrow Connector 9">
               <a:extLst>
                 <a:ext uri="{FF2B5EF4-FFF2-40B4-BE49-F238E27FC236}">
-                  <a16:creationId xmlns:a16="http://schemas.microsoft.com/office/drawing/2014/main" xmlns="" id="{A1AEC7D8-6FC3-40B3-AEB1-F0ED43028CA3}"/>
+                  <a16:creationId xmlns="" xmlns:a16="http://schemas.microsoft.com/office/drawing/2014/main" id="{A1AEC7D8-6FC3-40B3-AEB1-F0ED43028CA3}"/>
                 </a:ext>
               </a:extLst>
             </p:cNvPr>
@@ -3340,8 +3974,8 @@
           </p:nvCxnSpPr>
           <p:spPr>
             <a:xfrm>
-              <a:off x="4680012" y="1988820"/>
-              <a:ext cx="340" cy="648112"/>
+              <a:off x="3687453" y="7347586"/>
+              <a:ext cx="236" cy="450404"/>
             </a:xfrm>
             <a:prstGeom prst="straightConnector1">
               <a:avLst/>
@@ -3370,7 +4004,7 @@
             <p:cNvPr id="11" name="Straight Arrow Connector 10">
               <a:extLst>
                 <a:ext uri="{FF2B5EF4-FFF2-40B4-BE49-F238E27FC236}">
-                  <a16:creationId xmlns:a16="http://schemas.microsoft.com/office/drawing/2014/main" xmlns="" id="{F4D7AF7F-D19C-4D71-A647-DD2DBFFA7C61}"/>
+                  <a16:creationId xmlns="" xmlns:a16="http://schemas.microsoft.com/office/drawing/2014/main" id="{F4D7AF7F-D19C-4D71-A647-DD2DBFFA7C61}"/>
                 </a:ext>
               </a:extLst>
             </p:cNvPr>
@@ -3379,8 +4013,8 @@
           </p:nvCxnSpPr>
           <p:spPr>
             <a:xfrm>
-              <a:off x="5003708" y="1988820"/>
-              <a:ext cx="340" cy="648112"/>
+              <a:off x="3904371" y="7347586"/>
+              <a:ext cx="236" cy="450404"/>
             </a:xfrm>
             <a:prstGeom prst="straightConnector1">
               <a:avLst/>
@@ -3409,7 +4043,7 @@
             <p:cNvPr id="12" name="Straight Arrow Connector 11">
               <a:extLst>
                 <a:ext uri="{FF2B5EF4-FFF2-40B4-BE49-F238E27FC236}">
-                  <a16:creationId xmlns:a16="http://schemas.microsoft.com/office/drawing/2014/main" xmlns="" id="{32560E45-5031-42A7-8952-3E816749B3B2}"/>
+                  <a16:creationId xmlns="" xmlns:a16="http://schemas.microsoft.com/office/drawing/2014/main" id="{32560E45-5031-42A7-8952-3E816749B3B2}"/>
                 </a:ext>
               </a:extLst>
             </p:cNvPr>
@@ -3418,8 +4052,8 @@
           </p:nvCxnSpPr>
           <p:spPr>
             <a:xfrm>
-              <a:off x="5316144" y="1988820"/>
-              <a:ext cx="340" cy="648112"/>
+              <a:off x="4121287" y="7347586"/>
+              <a:ext cx="236" cy="450404"/>
             </a:xfrm>
             <a:prstGeom prst="straightConnector1">
               <a:avLst/>
@@ -3449,7 +4083,7 @@
             <p:cNvPr id="13" name="Straight Arrow Connector 12">
               <a:extLst>
                 <a:ext uri="{FF2B5EF4-FFF2-40B4-BE49-F238E27FC236}">
-                  <a16:creationId xmlns:a16="http://schemas.microsoft.com/office/drawing/2014/main" xmlns="" id="{4AFD4B02-CC6B-4665-9617-FDA990F9CE41}"/>
+                  <a16:creationId xmlns="" xmlns:a16="http://schemas.microsoft.com/office/drawing/2014/main" id="{4AFD4B02-CC6B-4665-9617-FDA990F9CE41}"/>
                 </a:ext>
               </a:extLst>
             </p:cNvPr>
@@ -3458,8 +4092,8 @@
           </p:nvCxnSpPr>
           <p:spPr>
             <a:xfrm>
-              <a:off x="4355636" y="1988820"/>
-              <a:ext cx="340" cy="648112"/>
+              <a:off x="3470535" y="7347586"/>
+              <a:ext cx="236" cy="450404"/>
             </a:xfrm>
             <a:prstGeom prst="straightConnector1">
               <a:avLst/>
@@ -3488,7 +4122,7 @@
             <p:cNvPr id="14" name="Straight Arrow Connector 13">
               <a:extLst>
                 <a:ext uri="{FF2B5EF4-FFF2-40B4-BE49-F238E27FC236}">
-                  <a16:creationId xmlns:a16="http://schemas.microsoft.com/office/drawing/2014/main" xmlns="" id="{ECAFA849-1183-4839-A8AB-D1BCBA99A519}"/>
+                  <a16:creationId xmlns="" xmlns:a16="http://schemas.microsoft.com/office/drawing/2014/main" id="{ECAFA849-1183-4839-A8AB-D1BCBA99A519}"/>
                 </a:ext>
               </a:extLst>
             </p:cNvPr>
@@ -3497,8 +4131,8 @@
           </p:nvCxnSpPr>
           <p:spPr>
             <a:xfrm>
-              <a:off x="4067604" y="1988820"/>
-              <a:ext cx="340" cy="648112"/>
+              <a:off x="3253617" y="7347586"/>
+              <a:ext cx="236" cy="450404"/>
             </a:xfrm>
             <a:prstGeom prst="straightConnector1">
               <a:avLst/>
@@ -3527,7 +4161,7 @@
             <p:cNvPr id="15" name="Isosceles Triangle 14">
               <a:extLst>
                 <a:ext uri="{FF2B5EF4-FFF2-40B4-BE49-F238E27FC236}">
-                  <a16:creationId xmlns:a16="http://schemas.microsoft.com/office/drawing/2014/main" xmlns="" id="{F59F7412-454D-4DB9-B214-72F987171BAC}"/>
+                  <a16:creationId xmlns="" xmlns:a16="http://schemas.microsoft.com/office/drawing/2014/main" id="{F59F7412-454D-4DB9-B214-72F987171BAC}"/>
                 </a:ext>
               </a:extLst>
             </p:cNvPr>
@@ -3536,8 +4170,8 @@
           </p:nvSpPr>
           <p:spPr>
             <a:xfrm rot="5400000">
-              <a:off x="3563980" y="4461084"/>
-              <a:ext cx="288032" cy="216024"/>
+              <a:off x="2903625" y="9065679"/>
+              <a:ext cx="200167" cy="150125"/>
             </a:xfrm>
             <a:prstGeom prst="triangle">
               <a:avLst/>
@@ -3572,7 +4206,7 @@
             <p:cNvPr id="16" name="Straight Arrow Connector 15">
               <a:extLst>
                 <a:ext uri="{FF2B5EF4-FFF2-40B4-BE49-F238E27FC236}">
-                  <a16:creationId xmlns:a16="http://schemas.microsoft.com/office/drawing/2014/main" xmlns="" id="{281D3167-3E0F-4CA2-AA49-61E53CAFBFB0}"/>
+                  <a16:creationId xmlns="" xmlns:a16="http://schemas.microsoft.com/office/drawing/2014/main" id="{281D3167-3E0F-4CA2-AA49-61E53CAFBFB0}"/>
                 </a:ext>
               </a:extLst>
             </p:cNvPr>
@@ -3581,8 +4215,8 @@
           </p:nvCxnSpPr>
           <p:spPr>
             <a:xfrm>
-              <a:off x="3313956" y="4574778"/>
-              <a:ext cx="288032" cy="0"/>
+              <a:off x="2729872" y="9144691"/>
+              <a:ext cx="200167" cy="0"/>
             </a:xfrm>
             <a:prstGeom prst="straightConnector1">
               <a:avLst/>
@@ -3611,7 +4245,7 @@
             <p:cNvPr id="17" name="TextBox 16">
               <a:extLst>
                 <a:ext uri="{FF2B5EF4-FFF2-40B4-BE49-F238E27FC236}">
-                  <a16:creationId xmlns:a16="http://schemas.microsoft.com/office/drawing/2014/main" xmlns="" id="{D9B04034-84B1-4FBC-8CA4-313BCDD62305}"/>
+                  <a16:creationId xmlns="" xmlns:a16="http://schemas.microsoft.com/office/drawing/2014/main" id="{D9B04034-84B1-4FBC-8CA4-313BCDD62305}"/>
                 </a:ext>
               </a:extLst>
             </p:cNvPr>
@@ -3620,8 +4254,8 @@
           </p:nvSpPr>
           <p:spPr>
             <a:xfrm rot="16200000">
-              <a:off x="3743770" y="2807845"/>
-              <a:ext cx="546945" cy="246221"/>
+              <a:off x="3019357" y="7844046"/>
+              <a:ext cx="465192" cy="230832"/>
             </a:xfrm>
             <a:prstGeom prst="rect">
               <a:avLst/>
@@ -3635,9 +4269,10 @@
             <a:lstStyle/>
             <a:p>
               <a:r>
-                <a:rPr lang="en-NZ" sz="1000" dirty="0"/>
-                <a:t>PIO-0</a:t>
+                <a:rPr lang="en-NZ" sz="900" dirty="0" smtClean="0"/>
+                <a:t>PIO_0</a:t>
               </a:r>
+              <a:endParaRPr lang="en-NZ" sz="900" dirty="0"/>
             </a:p>
           </p:txBody>
         </p:sp>
@@ -3646,7 +4281,7 @@
             <p:cNvPr id="18" name="TextBox 17">
               <a:extLst>
                 <a:ext uri="{FF2B5EF4-FFF2-40B4-BE49-F238E27FC236}">
-                  <a16:creationId xmlns:a16="http://schemas.microsoft.com/office/drawing/2014/main" xmlns="" id="{7986E28C-C7A8-4814-AB83-000F65F163F4}"/>
+                  <a16:creationId xmlns="" xmlns:a16="http://schemas.microsoft.com/office/drawing/2014/main" id="{7986E28C-C7A8-4814-AB83-000F65F163F4}"/>
                 </a:ext>
               </a:extLst>
             </p:cNvPr>
@@ -3655,8 +4290,8 @@
           </p:nvSpPr>
           <p:spPr>
             <a:xfrm rot="16200000">
-              <a:off x="4028208" y="2807845"/>
-              <a:ext cx="546945" cy="246221"/>
+              <a:off x="3235021" y="7844046"/>
+              <a:ext cx="465192" cy="230832"/>
             </a:xfrm>
             <a:prstGeom prst="rect">
               <a:avLst/>
@@ -3670,9 +4305,10 @@
             <a:lstStyle/>
             <a:p>
               <a:r>
-                <a:rPr lang="en-NZ" sz="1000" dirty="0"/>
-                <a:t>PIO-1</a:t>
+                <a:rPr lang="en-NZ" sz="900" dirty="0" smtClean="0"/>
+                <a:t>PIO_1</a:t>
               </a:r>
+              <a:endParaRPr lang="en-NZ" sz="900" dirty="0"/>
             </a:p>
           </p:txBody>
         </p:sp>
@@ -3681,7 +4317,7 @@
             <p:cNvPr id="19" name="TextBox 18">
               <a:extLst>
                 <a:ext uri="{FF2B5EF4-FFF2-40B4-BE49-F238E27FC236}">
-                  <a16:creationId xmlns:a16="http://schemas.microsoft.com/office/drawing/2014/main" xmlns="" id="{361F70E2-614E-4FE9-9396-E45C43954CB4}"/>
+                  <a16:creationId xmlns="" xmlns:a16="http://schemas.microsoft.com/office/drawing/2014/main" id="{361F70E2-614E-4FE9-9396-E45C43954CB4}"/>
                 </a:ext>
               </a:extLst>
             </p:cNvPr>
@@ -3690,8 +4326,8 @@
           </p:nvSpPr>
           <p:spPr>
             <a:xfrm rot="16200000">
-              <a:off x="4349669" y="2807845"/>
-              <a:ext cx="546945" cy="246221"/>
+              <a:off x="3450685" y="7844046"/>
+              <a:ext cx="465192" cy="230832"/>
             </a:xfrm>
             <a:prstGeom prst="rect">
               <a:avLst/>
@@ -3705,9 +4341,10 @@
             <a:lstStyle/>
             <a:p>
               <a:r>
-                <a:rPr lang="en-NZ" sz="1000" dirty="0"/>
-                <a:t>PIO-2</a:t>
+                <a:rPr lang="en-NZ" sz="900" dirty="0" smtClean="0"/>
+                <a:t>PIO_2</a:t>
               </a:r>
+              <a:endParaRPr lang="en-NZ" sz="900" dirty="0"/>
             </a:p>
           </p:txBody>
         </p:sp>
@@ -3716,7 +4353,7 @@
             <p:cNvPr id="20" name="TextBox 19">
               <a:extLst>
                 <a:ext uri="{FF2B5EF4-FFF2-40B4-BE49-F238E27FC236}">
-                  <a16:creationId xmlns:a16="http://schemas.microsoft.com/office/drawing/2014/main" xmlns="" id="{62A32D07-C9C7-430E-BA03-8AE4B56C9EC7}"/>
+                  <a16:creationId xmlns="" xmlns:a16="http://schemas.microsoft.com/office/drawing/2014/main" id="{62A32D07-C9C7-430E-BA03-8AE4B56C9EC7}"/>
                 </a:ext>
               </a:extLst>
             </p:cNvPr>
@@ -3725,8 +4362,8 @@
           </p:nvSpPr>
           <p:spPr>
             <a:xfrm rot="16200000">
-              <a:off x="4691319" y="2807844"/>
-              <a:ext cx="546945" cy="246221"/>
+              <a:off x="3666349" y="7844046"/>
+              <a:ext cx="465192" cy="230832"/>
             </a:xfrm>
             <a:prstGeom prst="rect">
               <a:avLst/>
@@ -3740,9 +4377,10 @@
             <a:lstStyle/>
             <a:p>
               <a:r>
-                <a:rPr lang="en-NZ" sz="1000" dirty="0"/>
-                <a:t>PIO-3</a:t>
+                <a:rPr lang="en-NZ" sz="900" dirty="0" smtClean="0"/>
+                <a:t>PIO_3</a:t>
               </a:r>
+              <a:endParaRPr lang="en-NZ" sz="900" dirty="0"/>
             </a:p>
           </p:txBody>
         </p:sp>
@@ -3751,7 +4389,7 @@
             <p:cNvPr id="21" name="TextBox 20">
               <a:extLst>
                 <a:ext uri="{FF2B5EF4-FFF2-40B4-BE49-F238E27FC236}">
-                  <a16:creationId xmlns:a16="http://schemas.microsoft.com/office/drawing/2014/main" xmlns="" id="{08E8071D-767E-42E5-BFE9-CEDC43FD7EA6}"/>
+                  <a16:creationId xmlns="" xmlns:a16="http://schemas.microsoft.com/office/drawing/2014/main" id="{08E8071D-767E-42E5-BFE9-CEDC43FD7EA6}"/>
                 </a:ext>
               </a:extLst>
             </p:cNvPr>
@@ -3760,8 +4398,8 @@
           </p:nvSpPr>
           <p:spPr>
             <a:xfrm rot="16200000">
-              <a:off x="4985094" y="2807844"/>
-              <a:ext cx="546945" cy="246221"/>
+              <a:off x="3882012" y="7844046"/>
+              <a:ext cx="465192" cy="230832"/>
             </a:xfrm>
             <a:prstGeom prst="rect">
               <a:avLst/>
@@ -3775,18 +4413,19 @@
             <a:lstStyle/>
             <a:p>
               <a:r>
-                <a:rPr lang="en-NZ" sz="1000" dirty="0"/>
-                <a:t>PIO-4</a:t>
+                <a:rPr lang="en-NZ" sz="900" dirty="0" smtClean="0"/>
+                <a:t>PIO_4</a:t>
               </a:r>
+              <a:endParaRPr lang="en-NZ" sz="900" dirty="0"/>
             </a:p>
           </p:txBody>
         </p:sp>
         <p:sp>
           <p:nvSpPr>
-            <p:cNvPr id="22" name="TextBox 21">
+            <p:cNvPr id="23" name="TextBox 22">
               <a:extLst>
                 <a:ext uri="{FF2B5EF4-FFF2-40B4-BE49-F238E27FC236}">
-                  <a16:creationId xmlns:a16="http://schemas.microsoft.com/office/drawing/2014/main" xmlns="" id="{A7470164-AA68-40D0-8887-868547C1F83F}"/>
+                  <a16:creationId xmlns="" xmlns:a16="http://schemas.microsoft.com/office/drawing/2014/main" id="{8A09CE70-2EA4-478B-9D45-B94DD330B64C}"/>
                 </a:ext>
               </a:extLst>
             </p:cNvPr>
@@ -3795,43 +4434,8 @@
           </p:nvSpPr>
           <p:spPr>
             <a:xfrm>
-              <a:off x="3682911" y="2137943"/>
-              <a:ext cx="348172" cy="246221"/>
-            </a:xfrm>
-            <a:prstGeom prst="rect">
-              <a:avLst/>
-            </a:prstGeom>
-            <a:noFill/>
-          </p:spPr>
-          <p:txBody>
-            <a:bodyPr wrap="none" rtlCol="0">
-              <a:spAutoFit/>
-            </a:bodyPr>
-            <a:lstStyle/>
-            <a:p>
-              <a:r>
-                <a:rPr lang="en-NZ" sz="1000" dirty="0"/>
-                <a:t>24</a:t>
-              </a:r>
-            </a:p>
-          </p:txBody>
-        </p:sp>
-        <p:sp>
-          <p:nvSpPr>
-            <p:cNvPr id="23" name="TextBox 22">
-              <a:extLst>
-                <a:ext uri="{FF2B5EF4-FFF2-40B4-BE49-F238E27FC236}">
-                  <a16:creationId xmlns:a16="http://schemas.microsoft.com/office/drawing/2014/main" xmlns="" id="{8A09CE70-2EA4-478B-9D45-B94DD330B64C}"/>
-                </a:ext>
-              </a:extLst>
-            </p:cNvPr>
-            <p:cNvSpPr txBox="1"/>
-            <p:nvPr/>
-          </p:nvSpPr>
-          <p:spPr>
-            <a:xfrm>
-              <a:off x="4008254" y="2133849"/>
-              <a:ext cx="348172" cy="246221"/>
+              <a:off x="3237216" y="7442434"/>
+              <a:ext cx="241961" cy="171111"/>
             </a:xfrm>
             <a:prstGeom prst="rect">
               <a:avLst/>
@@ -3856,7 +4460,7 @@
             <p:cNvPr id="24" name="TextBox 23">
               <a:extLst>
                 <a:ext uri="{FF2B5EF4-FFF2-40B4-BE49-F238E27FC236}">
-                  <a16:creationId xmlns:a16="http://schemas.microsoft.com/office/drawing/2014/main" xmlns="" id="{8165E5A2-91CC-4FEC-8D28-33EA50F74498}"/>
+                  <a16:creationId xmlns="" xmlns:a16="http://schemas.microsoft.com/office/drawing/2014/main" id="{8165E5A2-91CC-4FEC-8D28-33EA50F74498}"/>
                 </a:ext>
               </a:extLst>
             </p:cNvPr>
@@ -3865,8 +4469,8 @@
           </p:nvSpPr>
           <p:spPr>
             <a:xfrm>
-              <a:off x="4343909" y="2125303"/>
-              <a:ext cx="348172" cy="246221"/>
+              <a:off x="3454940" y="7442434"/>
+              <a:ext cx="241961" cy="171111"/>
             </a:xfrm>
             <a:prstGeom prst="rect">
               <a:avLst/>
@@ -3891,7 +4495,7 @@
             <p:cNvPr id="25" name="TextBox 24">
               <a:extLst>
                 <a:ext uri="{FF2B5EF4-FFF2-40B4-BE49-F238E27FC236}">
-                  <a16:creationId xmlns:a16="http://schemas.microsoft.com/office/drawing/2014/main" xmlns="" id="{4D94F884-DE75-4680-BF2D-0BEB3C78E075}"/>
+                  <a16:creationId xmlns="" xmlns:a16="http://schemas.microsoft.com/office/drawing/2014/main" id="{4D94F884-DE75-4680-BF2D-0BEB3C78E075}"/>
                 </a:ext>
               </a:extLst>
             </p:cNvPr>
@@ -3900,8 +4504,8 @@
           </p:nvSpPr>
           <p:spPr>
             <a:xfrm>
-              <a:off x="4678704" y="2129397"/>
-              <a:ext cx="348172" cy="246221"/>
+              <a:off x="3672664" y="7442434"/>
+              <a:ext cx="241961" cy="171111"/>
             </a:xfrm>
             <a:prstGeom prst="rect">
               <a:avLst/>
@@ -3926,7 +4530,7 @@
             <p:cNvPr id="26" name="TextBox 25">
               <a:extLst>
                 <a:ext uri="{FF2B5EF4-FFF2-40B4-BE49-F238E27FC236}">
-                  <a16:creationId xmlns:a16="http://schemas.microsoft.com/office/drawing/2014/main" xmlns="" id="{931775D0-803C-427F-A837-280D2D891B94}"/>
+                  <a16:creationId xmlns="" xmlns:a16="http://schemas.microsoft.com/office/drawing/2014/main" id="{931775D0-803C-427F-A837-280D2D891B94}"/>
                 </a:ext>
               </a:extLst>
             </p:cNvPr>
@@ -3935,8 +4539,8 @@
           </p:nvSpPr>
           <p:spPr>
             <a:xfrm>
-              <a:off x="4980465" y="2129395"/>
-              <a:ext cx="348172" cy="246221"/>
+              <a:off x="3890389" y="7442434"/>
+              <a:ext cx="241961" cy="171111"/>
             </a:xfrm>
             <a:prstGeom prst="rect">
               <a:avLst/>
@@ -3961,7 +4565,7 @@
             <p:cNvPr id="27" name="TextBox 26">
               <a:extLst>
                 <a:ext uri="{FF2B5EF4-FFF2-40B4-BE49-F238E27FC236}">
-                  <a16:creationId xmlns:a16="http://schemas.microsoft.com/office/drawing/2014/main" xmlns="" id="{0182744A-561C-40C9-AE2E-7143D573AD7C}"/>
+                  <a16:creationId xmlns="" xmlns:a16="http://schemas.microsoft.com/office/drawing/2014/main" id="{0182744A-561C-40C9-AE2E-7143D573AD7C}"/>
                 </a:ext>
               </a:extLst>
             </p:cNvPr>
@@ -3970,8 +4574,8 @@
           </p:nvSpPr>
           <p:spPr>
             <a:xfrm>
-              <a:off x="2579114" y="4425080"/>
-              <a:ext cx="770884" cy="354302"/>
+              <a:off x="2219195" y="9040658"/>
+              <a:ext cx="535724" cy="246221"/>
             </a:xfrm>
             <a:prstGeom prst="rect">
               <a:avLst/>
@@ -3992,610 +4596,46 @@
             </a:p>
           </p:txBody>
         </p:sp>
+        <p:sp>
+          <p:nvSpPr>
+            <p:cNvPr id="37" name="TextBox 36">
+              <a:extLst>
+                <a:ext uri="{FF2B5EF4-FFF2-40B4-BE49-F238E27FC236}">
+                  <a16:creationId xmlns="" xmlns:a16="http://schemas.microsoft.com/office/drawing/2014/main" id="{8A09CE70-2EA4-478B-9D45-B94DD330B64C}"/>
+                </a:ext>
+              </a:extLst>
+            </p:cNvPr>
+            <p:cNvSpPr txBox="1"/>
+            <p:nvPr/>
+          </p:nvSpPr>
+          <p:spPr>
+            <a:xfrm>
+              <a:off x="3019492" y="7442434"/>
+              <a:ext cx="241961" cy="171111"/>
+            </a:xfrm>
+            <a:prstGeom prst="rect">
+              <a:avLst/>
+            </a:prstGeom>
+            <a:noFill/>
+          </p:spPr>
+          <p:txBody>
+            <a:bodyPr wrap="none" rtlCol="0">
+              <a:spAutoFit/>
+            </a:bodyPr>
+            <a:lstStyle/>
+            <a:p>
+              <a:r>
+                <a:rPr lang="en-NZ" sz="1000" dirty="0"/>
+                <a:t>24</a:t>
+              </a:r>
+            </a:p>
+          </p:txBody>
+        </p:sp>
       </p:grpSp>
-      <p:sp>
-        <p:nvSpPr>
-          <p:cNvPr id="29" name="TextBox 28">
-            <a:extLst>
-              <a:ext uri="{FF2B5EF4-FFF2-40B4-BE49-F238E27FC236}">
-                <a16:creationId xmlns:a16="http://schemas.microsoft.com/office/drawing/2014/main" xmlns="" id="{EDA5309A-C74D-495F-A990-B14AFA67575F}"/>
-              </a:ext>
-            </a:extLst>
-          </p:cNvPr>
-          <p:cNvSpPr txBox="1"/>
-          <p:nvPr/>
-        </p:nvSpPr>
-        <p:spPr>
-          <a:xfrm>
-            <a:off x="442913" y="6599092"/>
-            <a:ext cx="2415020" cy="369332"/>
-          </a:xfrm>
-          <a:prstGeom prst="rect">
-            <a:avLst/>
-          </a:prstGeom>
-          <a:noFill/>
-        </p:spPr>
-        <p:txBody>
-          <a:bodyPr wrap="none" rtlCol="0">
-            <a:spAutoFit/>
-          </a:bodyPr>
-          <a:lstStyle/>
-          <a:p>
-            <a:r>
-              <a:rPr lang="en-NZ" u="sng" dirty="0"/>
-              <a:t>Interface Block Diagram</a:t>
-            </a:r>
-          </a:p>
-        </p:txBody>
-      </p:sp>
-      <p:sp>
-        <p:nvSpPr>
-          <p:cNvPr id="30" name="TextBox 29">
-            <a:extLst>
-              <a:ext uri="{FF2B5EF4-FFF2-40B4-BE49-F238E27FC236}">
-                <a16:creationId xmlns:a16="http://schemas.microsoft.com/office/drawing/2014/main" xmlns="" id="{D117A3BF-C002-42A4-97A4-FA42EAD1B659}"/>
-              </a:ext>
-            </a:extLst>
-          </p:cNvPr>
-          <p:cNvSpPr txBox="1"/>
-          <p:nvPr/>
-        </p:nvSpPr>
-        <p:spPr>
-          <a:xfrm>
-            <a:off x="253435" y="289878"/>
-            <a:ext cx="3325077" cy="461665"/>
-          </a:xfrm>
-          <a:prstGeom prst="rect">
-            <a:avLst/>
-          </a:prstGeom>
-          <a:noFill/>
-        </p:spPr>
-        <p:txBody>
-          <a:bodyPr wrap="none" rtlCol="0">
-            <a:spAutoFit/>
-          </a:bodyPr>
-          <a:lstStyle/>
-          <a:p>
-            <a:r>
-              <a:rPr lang="en-NZ" sz="2400" b="1" dirty="0"/>
-              <a:t>Hardware Filtering Stage</a:t>
-            </a:r>
-          </a:p>
-        </p:txBody>
-      </p:sp>
-      <p:sp>
-        <p:nvSpPr>
-          <p:cNvPr id="31" name="Rectangle 30">
-            <a:extLst>
-              <a:ext uri="{FF2B5EF4-FFF2-40B4-BE49-F238E27FC236}">
-                <a16:creationId xmlns:a16="http://schemas.microsoft.com/office/drawing/2014/main" xmlns="" id="{68B3D08F-9401-492D-8F29-7BD55A79E587}"/>
-              </a:ext>
-            </a:extLst>
-          </p:cNvPr>
-          <p:cNvSpPr/>
-          <p:nvPr/>
-        </p:nvSpPr>
-        <p:spPr>
-          <a:xfrm>
-            <a:off x="442912" y="935973"/>
-            <a:ext cx="3002723" cy="5349486"/>
-          </a:xfrm>
-          <a:prstGeom prst="rect">
-            <a:avLst/>
-          </a:prstGeom>
-          <a:noFill/>
-          <a:ln w="19050">
-            <a:solidFill>
-              <a:schemeClr val="tx1"/>
-            </a:solidFill>
-          </a:ln>
-        </p:spPr>
-        <p:style>
-          <a:lnRef idx="2">
-            <a:schemeClr val="accent1">
-              <a:shade val="50000"/>
-            </a:schemeClr>
-          </a:lnRef>
-          <a:fillRef idx="1">
-            <a:schemeClr val="accent1"/>
-          </a:fillRef>
-          <a:effectRef idx="0">
-            <a:schemeClr val="accent1"/>
-          </a:effectRef>
-          <a:fontRef idx="minor">
-            <a:schemeClr val="lt1"/>
-          </a:fontRef>
-        </p:style>
-        <p:txBody>
-          <a:bodyPr rtlCol="0" anchor="ctr"/>
-          <a:lstStyle/>
-          <a:p>
-            <a:pPr algn="ctr"/>
-            <a:endParaRPr lang="en-NZ" dirty="0"/>
-          </a:p>
-        </p:txBody>
-      </p:sp>
-      <p:sp>
-        <p:nvSpPr>
-          <p:cNvPr id="32" name="TextBox 31">
-            <a:extLst>
-              <a:ext uri="{FF2B5EF4-FFF2-40B4-BE49-F238E27FC236}">
-                <a16:creationId xmlns:a16="http://schemas.microsoft.com/office/drawing/2014/main" xmlns="" id="{B4A0254B-0478-4380-BBD6-E6C8D983A15F}"/>
-              </a:ext>
-            </a:extLst>
-          </p:cNvPr>
-          <p:cNvSpPr txBox="1"/>
-          <p:nvPr/>
-        </p:nvSpPr>
-        <p:spPr>
-          <a:xfrm>
-            <a:off x="436181" y="943982"/>
-            <a:ext cx="3023776" cy="5278368"/>
-          </a:xfrm>
-          <a:prstGeom prst="rect">
-            <a:avLst/>
-          </a:prstGeom>
-          <a:noFill/>
-        </p:spPr>
-        <p:txBody>
-          <a:bodyPr wrap="none" rtlCol="0">
-            <a:spAutoFit/>
-          </a:bodyPr>
-          <a:lstStyle/>
-          <a:p>
-            <a:r>
-              <a:rPr lang="en-NZ" u="sng" dirty="0"/>
-              <a:t>Memory Mapped Registers</a:t>
-            </a:r>
-          </a:p>
-          <a:p>
-            <a:endParaRPr lang="en-NZ" dirty="0"/>
-          </a:p>
-          <a:p>
-            <a:r>
-              <a:rPr lang="en-NZ" sz="1500" dirty="0"/>
-              <a:t>PIO-0 </a:t>
-            </a:r>
-            <a:r>
-              <a:rPr lang="en-NZ" sz="1500" i="1" dirty="0"/>
-              <a:t>(24 bits)</a:t>
-            </a:r>
-          </a:p>
-          <a:p>
-            <a:pPr marL="285750" indent="-285750">
-              <a:buFont typeface="Arial" panose="020B0604020202020204" pitchFamily="34" charset="0"/>
-              <a:buChar char="•"/>
-            </a:pPr>
-            <a:r>
-              <a:rPr lang="en-NZ" sz="1500" dirty="0"/>
-              <a:t>24-bit data vector</a:t>
-            </a:r>
-          </a:p>
-          <a:p>
-            <a:pPr marL="285750" indent="-285750">
-              <a:buFont typeface="Arial" panose="020B0604020202020204" pitchFamily="34" charset="0"/>
-              <a:buChar char="•"/>
-            </a:pPr>
-            <a:r>
-              <a:rPr lang="en-NZ" sz="1500" dirty="0"/>
-              <a:t>First 3 pixels in 3x3 window</a:t>
-            </a:r>
-          </a:p>
-          <a:p>
-            <a:endParaRPr lang="en-NZ" sz="1500" dirty="0"/>
-          </a:p>
-          <a:p>
-            <a:r>
-              <a:rPr lang="en-NZ" sz="1500" dirty="0"/>
-              <a:t>PIO-1 </a:t>
-            </a:r>
-            <a:r>
-              <a:rPr lang="en-NZ" sz="1500" i="1" dirty="0"/>
-              <a:t>(24 bits)</a:t>
-            </a:r>
-          </a:p>
-          <a:p>
-            <a:pPr marL="285750" indent="-285750">
-              <a:buFont typeface="Arial" panose="020B0604020202020204" pitchFamily="34" charset="0"/>
-              <a:buChar char="•"/>
-            </a:pPr>
-            <a:r>
-              <a:rPr lang="en-NZ" sz="1500" dirty="0"/>
-              <a:t>24-bit data vector</a:t>
-            </a:r>
-          </a:p>
-          <a:p>
-            <a:pPr marL="285750" indent="-285750">
-              <a:buFont typeface="Arial" panose="020B0604020202020204" pitchFamily="34" charset="0"/>
-              <a:buChar char="•"/>
-            </a:pPr>
-            <a:r>
-              <a:rPr lang="en-NZ" sz="1500" dirty="0"/>
-              <a:t>Second 3 pixels in 3x3 window</a:t>
-            </a:r>
-          </a:p>
-          <a:p>
-            <a:pPr marL="285750" indent="-285750">
-              <a:buFont typeface="Arial" panose="020B0604020202020204" pitchFamily="34" charset="0"/>
-              <a:buChar char="•"/>
-            </a:pPr>
-            <a:endParaRPr lang="en-NZ" sz="1500" dirty="0"/>
-          </a:p>
-          <a:p>
-            <a:r>
-              <a:rPr lang="en-NZ" sz="1500" dirty="0"/>
-              <a:t>PIO-2 </a:t>
-            </a:r>
-            <a:r>
-              <a:rPr lang="en-NZ" sz="1500" i="1" dirty="0"/>
-              <a:t>(24 bits)</a:t>
-            </a:r>
-          </a:p>
-          <a:p>
-            <a:pPr marL="285750" indent="-285750">
-              <a:buFont typeface="Arial" panose="020B0604020202020204" pitchFamily="34" charset="0"/>
-              <a:buChar char="•"/>
-            </a:pPr>
-            <a:r>
-              <a:rPr lang="en-NZ" sz="1500" dirty="0"/>
-              <a:t>24-bit data vector</a:t>
-            </a:r>
-          </a:p>
-          <a:p>
-            <a:pPr marL="285750" indent="-285750">
-              <a:buFont typeface="Arial" panose="020B0604020202020204" pitchFamily="34" charset="0"/>
-              <a:buChar char="•"/>
-            </a:pPr>
-            <a:r>
-              <a:rPr lang="en-NZ" sz="1500" dirty="0"/>
-              <a:t>Third 3 pixels in 3x3 window</a:t>
-            </a:r>
-          </a:p>
-          <a:p>
-            <a:endParaRPr lang="en-NZ" sz="1500" dirty="0"/>
-          </a:p>
-          <a:p>
-            <a:r>
-              <a:rPr lang="en-NZ" sz="1500" dirty="0"/>
-              <a:t>PIO-3 </a:t>
-            </a:r>
-            <a:r>
-              <a:rPr lang="en-NZ" sz="1500" i="1" dirty="0"/>
-              <a:t>(16 bits)</a:t>
-            </a:r>
-          </a:p>
-          <a:p>
-            <a:pPr marL="285750" indent="-285750">
-              <a:buFont typeface="Arial" panose="020B0604020202020204" pitchFamily="34" charset="0"/>
-              <a:buChar char="•"/>
-            </a:pPr>
-            <a:r>
-              <a:rPr lang="en-NZ" sz="1500" dirty="0"/>
-              <a:t>16-bit ID vector</a:t>
-            </a:r>
-          </a:p>
-          <a:p>
-            <a:pPr marL="285750" indent="-285750">
-              <a:buFont typeface="Arial" panose="020B0604020202020204" pitchFamily="34" charset="0"/>
-              <a:buChar char="•"/>
-            </a:pPr>
-            <a:r>
-              <a:rPr lang="en-NZ" sz="1500" dirty="0"/>
-              <a:t>Identifies 3x3 window</a:t>
-            </a:r>
-          </a:p>
-          <a:p>
-            <a:pPr marL="285750" indent="-285750">
-              <a:buFont typeface="Arial" panose="020B0604020202020204" pitchFamily="34" charset="0"/>
-              <a:buChar char="•"/>
-            </a:pPr>
-            <a:endParaRPr lang="en-NZ" sz="1500" dirty="0"/>
-          </a:p>
-          <a:p>
-            <a:r>
-              <a:rPr lang="en-NZ" sz="1500" dirty="0"/>
-              <a:t>PIO-4 </a:t>
-            </a:r>
-            <a:r>
-              <a:rPr lang="en-NZ" sz="1500" i="1" dirty="0"/>
-              <a:t>(24 bits)</a:t>
-            </a:r>
-          </a:p>
-          <a:p>
-            <a:pPr marL="285750" indent="-285750">
-              <a:buFont typeface="Arial" panose="020B0604020202020204" pitchFamily="34" charset="0"/>
-              <a:buChar char="•"/>
-            </a:pPr>
-            <a:r>
-              <a:rPr lang="en-NZ" sz="1500" dirty="0"/>
-              <a:t>First 16 bits is the ID vector</a:t>
-            </a:r>
-          </a:p>
-          <a:p>
-            <a:pPr marL="285750" indent="-285750">
-              <a:buFont typeface="Arial" panose="020B0604020202020204" pitchFamily="34" charset="0"/>
-              <a:buChar char="•"/>
-            </a:pPr>
-            <a:r>
-              <a:rPr lang="en-NZ" sz="1500" dirty="0"/>
-              <a:t>Next 8 bits is the computed pixel</a:t>
-            </a:r>
-          </a:p>
-          <a:p>
-            <a:endParaRPr lang="en-NZ" sz="1600" dirty="0"/>
-          </a:p>
-        </p:txBody>
-      </p:sp>
-      <p:sp>
-        <p:nvSpPr>
-          <p:cNvPr id="33" name="Rectangle 32">
-            <a:extLst>
-              <a:ext uri="{FF2B5EF4-FFF2-40B4-BE49-F238E27FC236}">
-                <a16:creationId xmlns:a16="http://schemas.microsoft.com/office/drawing/2014/main" xmlns="" id="{4D6DCE2E-A46F-4736-9759-13EEBFC1B1C9}"/>
-              </a:ext>
-            </a:extLst>
-          </p:cNvPr>
-          <p:cNvSpPr/>
-          <p:nvPr/>
-        </p:nvSpPr>
-        <p:spPr>
-          <a:xfrm>
-            <a:off x="3794580" y="462123"/>
-            <a:ext cx="2612775" cy="1333050"/>
-          </a:xfrm>
-          <a:prstGeom prst="rect">
-            <a:avLst/>
-          </a:prstGeom>
-          <a:noFill/>
-          <a:ln w="19050">
-            <a:solidFill>
-              <a:schemeClr val="tx1"/>
-            </a:solidFill>
-          </a:ln>
-        </p:spPr>
-        <p:style>
-          <a:lnRef idx="2">
-            <a:schemeClr val="accent1">
-              <a:shade val="50000"/>
-            </a:schemeClr>
-          </a:lnRef>
-          <a:fillRef idx="1">
-            <a:schemeClr val="accent1"/>
-          </a:fillRef>
-          <a:effectRef idx="0">
-            <a:schemeClr val="accent1"/>
-          </a:effectRef>
-          <a:fontRef idx="minor">
-            <a:schemeClr val="lt1"/>
-          </a:fontRef>
-        </p:style>
-        <p:txBody>
-          <a:bodyPr rtlCol="0" anchor="ctr"/>
-          <a:lstStyle/>
-          <a:p>
-            <a:pPr algn="ctr"/>
-            <a:endParaRPr lang="en-NZ" dirty="0"/>
-          </a:p>
-        </p:txBody>
-      </p:sp>
-      <p:sp>
-        <p:nvSpPr>
-          <p:cNvPr id="34" name="TextBox 33">
-            <a:extLst>
-              <a:ext uri="{FF2B5EF4-FFF2-40B4-BE49-F238E27FC236}">
-                <a16:creationId xmlns:a16="http://schemas.microsoft.com/office/drawing/2014/main" xmlns="" id="{830F5BF7-003D-4AC8-B7A7-8C6B17DEBFD6}"/>
-              </a:ext>
-            </a:extLst>
-          </p:cNvPr>
-          <p:cNvSpPr txBox="1"/>
-          <p:nvPr/>
-        </p:nvSpPr>
-        <p:spPr>
-          <a:xfrm>
-            <a:off x="3853013" y="548353"/>
-            <a:ext cx="1895584" cy="1200329"/>
-          </a:xfrm>
-          <a:prstGeom prst="rect">
-            <a:avLst/>
-          </a:prstGeom>
-          <a:noFill/>
-        </p:spPr>
-        <p:txBody>
-          <a:bodyPr wrap="none" rtlCol="0">
-            <a:spAutoFit/>
-          </a:bodyPr>
-          <a:lstStyle/>
-          <a:p>
-            <a:r>
-              <a:rPr lang="en-NZ" b="1" dirty="0"/>
-              <a:t>COMPSYS 701</a:t>
-            </a:r>
-          </a:p>
-          <a:p>
-            <a:r>
-              <a:rPr lang="en-NZ" dirty="0"/>
-              <a:t>Project Phase Two</a:t>
-            </a:r>
-          </a:p>
-          <a:p>
-            <a:endParaRPr lang="en-NZ" dirty="0"/>
-          </a:p>
-          <a:p>
-            <a:r>
-              <a:rPr lang="en-NZ" dirty="0"/>
-              <a:t>Group 4</a:t>
-            </a:r>
-          </a:p>
-        </p:txBody>
-      </p:sp>
-      <p:sp>
-        <p:nvSpPr>
-          <p:cNvPr id="35" name="Rectangle 34">
-            <a:extLst>
-              <a:ext uri="{FF2B5EF4-FFF2-40B4-BE49-F238E27FC236}">
-                <a16:creationId xmlns:a16="http://schemas.microsoft.com/office/drawing/2014/main" xmlns="" id="{2597C520-F46C-4907-AC9E-F2A95D0CE791}"/>
-              </a:ext>
-            </a:extLst>
-          </p:cNvPr>
-          <p:cNvSpPr/>
-          <p:nvPr/>
-        </p:nvSpPr>
-        <p:spPr>
-          <a:xfrm>
-            <a:off x="3794580" y="2078277"/>
-            <a:ext cx="2612775" cy="4207182"/>
-          </a:xfrm>
-          <a:prstGeom prst="rect">
-            <a:avLst/>
-          </a:prstGeom>
-          <a:noFill/>
-          <a:ln w="19050">
-            <a:solidFill>
-              <a:schemeClr val="tx1"/>
-            </a:solidFill>
-          </a:ln>
-        </p:spPr>
-        <p:style>
-          <a:lnRef idx="2">
-            <a:schemeClr val="accent1">
-              <a:shade val="50000"/>
-            </a:schemeClr>
-          </a:lnRef>
-          <a:fillRef idx="1">
-            <a:schemeClr val="accent1"/>
-          </a:fillRef>
-          <a:effectRef idx="0">
-            <a:schemeClr val="accent1"/>
-          </a:effectRef>
-          <a:fontRef idx="minor">
-            <a:schemeClr val="lt1"/>
-          </a:fontRef>
-        </p:style>
-        <p:txBody>
-          <a:bodyPr rtlCol="0" anchor="ctr"/>
-          <a:lstStyle/>
-          <a:p>
-            <a:pPr algn="ctr"/>
-            <a:endParaRPr lang="en-NZ" dirty="0"/>
-          </a:p>
-        </p:txBody>
-      </p:sp>
-      <p:sp>
-        <p:nvSpPr>
-          <p:cNvPr id="36" name="TextBox 35">
-            <a:extLst>
-              <a:ext uri="{FF2B5EF4-FFF2-40B4-BE49-F238E27FC236}">
-                <a16:creationId xmlns:a16="http://schemas.microsoft.com/office/drawing/2014/main" xmlns="" id="{8C453154-660E-418B-904C-5F7E234EA62B}"/>
-              </a:ext>
-            </a:extLst>
-          </p:cNvPr>
-          <p:cNvSpPr txBox="1"/>
-          <p:nvPr/>
-        </p:nvSpPr>
-        <p:spPr>
-          <a:xfrm>
-            <a:off x="3809107" y="2108107"/>
-            <a:ext cx="2598248" cy="4847481"/>
-          </a:xfrm>
-          <a:prstGeom prst="rect">
-            <a:avLst/>
-          </a:prstGeom>
-          <a:noFill/>
-        </p:spPr>
-        <p:txBody>
-          <a:bodyPr wrap="square" rtlCol="0">
-            <a:spAutoFit/>
-          </a:bodyPr>
-          <a:lstStyle/>
-          <a:p>
-            <a:r>
-              <a:rPr lang="en-NZ" u="sng" dirty="0"/>
-              <a:t>Operation</a:t>
-            </a:r>
-          </a:p>
-          <a:p>
-            <a:endParaRPr lang="en-NZ" u="sng" dirty="0"/>
-          </a:p>
-          <a:p>
-            <a:pPr marL="285750" indent="-285750">
-              <a:buFont typeface="Arial" panose="020B0604020202020204" pitchFamily="34" charset="0"/>
-              <a:buChar char="•"/>
-            </a:pPr>
-            <a:r>
-              <a:rPr lang="en-NZ" sz="1500" dirty="0"/>
-              <a:t>Convert 3x3 window into three 24-bit binary numbers, each composed of three 8-bit chars concatenated together</a:t>
-            </a:r>
-          </a:p>
-          <a:p>
-            <a:pPr marL="285750" indent="-285750">
-              <a:buFont typeface="Arial" panose="020B0604020202020204" pitchFamily="34" charset="0"/>
-              <a:buChar char="•"/>
-            </a:pPr>
-            <a:endParaRPr lang="en-NZ" sz="1500" dirty="0"/>
-          </a:p>
-          <a:p>
-            <a:pPr marL="285750" indent="-285750">
-              <a:buFont typeface="Arial" panose="020B0604020202020204" pitchFamily="34" charset="0"/>
-              <a:buChar char="•"/>
-            </a:pPr>
-            <a:r>
-              <a:rPr lang="en-NZ" sz="1500" dirty="0"/>
-              <a:t>Write binary numbers to data registers and a unique ID to id register</a:t>
-            </a:r>
-          </a:p>
-          <a:p>
-            <a:endParaRPr lang="en-NZ" sz="1500" dirty="0"/>
-          </a:p>
-          <a:p>
-            <a:pPr marL="285750" indent="-285750">
-              <a:buFont typeface="Arial" panose="020B0604020202020204" pitchFamily="34" charset="0"/>
-              <a:buChar char="•"/>
-            </a:pPr>
-            <a:r>
-              <a:rPr lang="en-NZ" sz="1500" dirty="0"/>
-              <a:t>Wait for FPGA to write to receive register</a:t>
-            </a:r>
-          </a:p>
-          <a:p>
-            <a:pPr marL="285750" indent="-285750">
-              <a:buFont typeface="Arial" panose="020B0604020202020204" pitchFamily="34" charset="0"/>
-              <a:buChar char="•"/>
-            </a:pPr>
-            <a:endParaRPr lang="en-NZ" sz="1500" dirty="0"/>
-          </a:p>
-          <a:p>
-            <a:pPr marL="285750" indent="-285750">
-              <a:buFont typeface="Arial" panose="020B0604020202020204" pitchFamily="34" charset="0"/>
-              <a:buChar char="•"/>
-            </a:pPr>
-            <a:r>
-              <a:rPr lang="en-NZ" sz="1500" dirty="0"/>
-              <a:t>Use ID to place receive char in the correct position</a:t>
-            </a:r>
-          </a:p>
-          <a:p>
-            <a:pPr marL="285750" indent="-285750">
-              <a:buFont typeface="Arial" panose="020B0604020202020204" pitchFamily="34" charset="0"/>
-              <a:buChar char="•"/>
-            </a:pPr>
-            <a:endParaRPr lang="en-NZ" sz="1500" dirty="0"/>
-          </a:p>
-          <a:p>
-            <a:pPr marL="285750" indent="-285750">
-              <a:buFont typeface="Arial" panose="020B0604020202020204" pitchFamily="34" charset="0"/>
-              <a:buChar char="•"/>
-            </a:pPr>
-            <a:endParaRPr lang="en-NZ" sz="1500" dirty="0"/>
-          </a:p>
-          <a:p>
-            <a:endParaRPr lang="en-NZ" dirty="0"/>
-          </a:p>
-        </p:txBody>
-      </p:sp>
     </p:spTree>
     <p:extLst>
       <p:ext uri="{BB962C8B-B14F-4D97-AF65-F5344CB8AC3E}">
-        <p14:creationId xmlns:p14="http://schemas.microsoft.com/office/powerpoint/2010/main" xmlns="" val="441765901"/>
+        <p14:creationId xmlns="" xmlns:p14="http://schemas.microsoft.com/office/powerpoint/2010/main" val="441765901"/>
       </p:ext>
     </p:extLst>
   </p:cSld>
@@ -4860,7 +4900,7 @@
   <a:extraClrSchemeLst/>
   <a:extLst>
     <a:ext uri="{05A4C25C-085E-4340-85A3-A5531E510DB2}">
-      <thm15:themeFamily xmlns:thm15="http://schemas.microsoft.com/office/thememl/2012/main" xmlns="" name="Office Theme" id="{62F939B6-93AF-4DB8-9C6B-D6C7DFDC589F}" vid="{4A3C46E8-61CC-4603-A589-7422A47A8E4A}"/>
+      <thm15:themeFamily xmlns="" xmlns:thm15="http://schemas.microsoft.com/office/thememl/2012/main" name="Office Theme" id="{62F939B6-93AF-4DB8-9C6B-D6C7DFDC589F}" vid="{4A3C46E8-61CC-4603-A589-7422A47A8E4A}"/>
     </a:ext>
   </a:extLst>
 </a:theme>

</xml_diff>